<commit_message>
Add slideshow for video
</commit_message>
<xml_diff>
--- a/Static/ProblemDescription.pptx
+++ b/Static/ProblemDescription.pptx
@@ -4,10 +4,16 @@
   <p:sldMasterIdLst>
     <p:sldMasterId id="2147483648" r:id="rId1"/>
   </p:sldMasterIdLst>
+  <p:notesMasterIdLst>
+    <p:notesMasterId r:id="rId8"/>
+  </p:notesMasterIdLst>
   <p:sldIdLst>
     <p:sldId id="256" r:id="rId2"/>
     <p:sldId id="257" r:id="rId3"/>
     <p:sldId id="258" r:id="rId4"/>
+    <p:sldId id="259" r:id="rId5"/>
+    <p:sldId id="260" r:id="rId6"/>
+    <p:sldId id="261" r:id="rId7"/>
   </p:sldIdLst>
   <p:sldSz cx="12192000" cy="6858000"/>
   <p:notesSz cx="6858000" cy="9144000"/>
@@ -107,6 +113,770 @@
     </a:lvl9pPr>
   </p:defaultTextStyle>
 </p:presentation>
+</file>
+
+<file path=ppt/notesMasters/notesMaster1.xml><?xml version="1.0" encoding="utf-8"?>
+<p:notesMaster xmlns:a="http://schemas.openxmlformats.org/drawingml/2006/main" xmlns:r="http://schemas.openxmlformats.org/officeDocument/2006/relationships" xmlns:p="http://schemas.openxmlformats.org/presentationml/2006/main">
+  <p:cSld>
+    <p:bg>
+      <p:bgRef idx="1001">
+        <a:schemeClr val="bg1"/>
+      </p:bgRef>
+    </p:bg>
+    <p:spTree>
+      <p:nvGrpSpPr>
+        <p:cNvPr id="1" name=""/>
+        <p:cNvGrpSpPr/>
+        <p:nvPr/>
+      </p:nvGrpSpPr>
+      <p:grpSpPr>
+        <a:xfrm>
+          <a:off x="0" y="0"/>
+          <a:ext cx="0" cy="0"/>
+          <a:chOff x="0" y="0"/>
+          <a:chExt cx="0" cy="0"/>
+        </a:xfrm>
+      </p:grpSpPr>
+      <p:sp>
+        <p:nvSpPr>
+          <p:cNvPr id="2" name="Header Placeholder 1"/>
+          <p:cNvSpPr>
+            <a:spLocks noGrp="1"/>
+          </p:cNvSpPr>
+          <p:nvPr>
+            <p:ph type="hdr" sz="quarter"/>
+          </p:nvPr>
+        </p:nvSpPr>
+        <p:spPr>
+          <a:xfrm>
+            <a:off x="0" y="0"/>
+            <a:ext cx="2971800" cy="458788"/>
+          </a:xfrm>
+          <a:prstGeom prst="rect">
+            <a:avLst/>
+          </a:prstGeom>
+        </p:spPr>
+        <p:txBody>
+          <a:bodyPr vert="horz" lIns="91440" tIns="45720" rIns="91440" bIns="45720" rtlCol="0"/>
+          <a:lstStyle>
+            <a:lvl1pPr algn="l">
+              <a:defRPr sz="1200"/>
+            </a:lvl1pPr>
+          </a:lstStyle>
+          <a:p>
+            <a:endParaRPr lang="en-US"/>
+          </a:p>
+        </p:txBody>
+      </p:sp>
+      <p:sp>
+        <p:nvSpPr>
+          <p:cNvPr id="3" name="Date Placeholder 2"/>
+          <p:cNvSpPr>
+            <a:spLocks noGrp="1"/>
+          </p:cNvSpPr>
+          <p:nvPr>
+            <p:ph type="dt" idx="1"/>
+          </p:nvPr>
+        </p:nvSpPr>
+        <p:spPr>
+          <a:xfrm>
+            <a:off x="3884613" y="0"/>
+            <a:ext cx="2971800" cy="458788"/>
+          </a:xfrm>
+          <a:prstGeom prst="rect">
+            <a:avLst/>
+          </a:prstGeom>
+        </p:spPr>
+        <p:txBody>
+          <a:bodyPr vert="horz" lIns="91440" tIns="45720" rIns="91440" bIns="45720" rtlCol="0"/>
+          <a:lstStyle>
+            <a:lvl1pPr algn="r">
+              <a:defRPr sz="1200"/>
+            </a:lvl1pPr>
+          </a:lstStyle>
+          <a:p>
+            <a:fld id="{46D84D39-79B2-4B5E-BE89-9A6FB595D07B}" type="datetimeFigureOut">
+              <a:rPr lang="en-US" smtClean="0"/>
+              <a:t>10/20/2023</a:t>
+            </a:fld>
+            <a:endParaRPr lang="en-US"/>
+          </a:p>
+        </p:txBody>
+      </p:sp>
+      <p:sp>
+        <p:nvSpPr>
+          <p:cNvPr id="4" name="Slide Image Placeholder 3"/>
+          <p:cNvSpPr>
+            <a:spLocks noGrp="1" noRot="1" noChangeAspect="1"/>
+          </p:cNvSpPr>
+          <p:nvPr>
+            <p:ph type="sldImg" idx="2"/>
+          </p:nvPr>
+        </p:nvSpPr>
+        <p:spPr>
+          <a:xfrm>
+            <a:off x="685800" y="1143000"/>
+            <a:ext cx="5486400" cy="3086100"/>
+          </a:xfrm>
+          <a:prstGeom prst="rect">
+            <a:avLst/>
+          </a:prstGeom>
+          <a:noFill/>
+          <a:ln w="12700">
+            <a:solidFill>
+              <a:prstClr val="black"/>
+            </a:solidFill>
+          </a:ln>
+        </p:spPr>
+        <p:txBody>
+          <a:bodyPr vert="horz" lIns="91440" tIns="45720" rIns="91440" bIns="45720" rtlCol="0" anchor="ctr"/>
+          <a:lstStyle/>
+          <a:p>
+            <a:endParaRPr lang="en-US"/>
+          </a:p>
+        </p:txBody>
+      </p:sp>
+      <p:sp>
+        <p:nvSpPr>
+          <p:cNvPr id="5" name="Notes Placeholder 4"/>
+          <p:cNvSpPr>
+            <a:spLocks noGrp="1"/>
+          </p:cNvSpPr>
+          <p:nvPr>
+            <p:ph type="body" sz="quarter" idx="3"/>
+          </p:nvPr>
+        </p:nvSpPr>
+        <p:spPr>
+          <a:xfrm>
+            <a:off x="685800" y="4400550"/>
+            <a:ext cx="5486400" cy="3600450"/>
+          </a:xfrm>
+          <a:prstGeom prst="rect">
+            <a:avLst/>
+          </a:prstGeom>
+        </p:spPr>
+        <p:txBody>
+          <a:bodyPr vert="horz" lIns="91440" tIns="45720" rIns="91440" bIns="45720" rtlCol="0"/>
+          <a:lstStyle/>
+          <a:p>
+            <a:pPr lvl="0"/>
+            <a:r>
+              <a:rPr lang="en-US"/>
+              <a:t>Click to edit Master text styles</a:t>
+            </a:r>
+          </a:p>
+          <a:p>
+            <a:pPr lvl="1"/>
+            <a:r>
+              <a:rPr lang="en-US"/>
+              <a:t>Second level</a:t>
+            </a:r>
+          </a:p>
+          <a:p>
+            <a:pPr lvl="2"/>
+            <a:r>
+              <a:rPr lang="en-US"/>
+              <a:t>Third level</a:t>
+            </a:r>
+          </a:p>
+          <a:p>
+            <a:pPr lvl="3"/>
+            <a:r>
+              <a:rPr lang="en-US"/>
+              <a:t>Fourth level</a:t>
+            </a:r>
+          </a:p>
+          <a:p>
+            <a:pPr lvl="4"/>
+            <a:r>
+              <a:rPr lang="en-US"/>
+              <a:t>Fifth level</a:t>
+            </a:r>
+          </a:p>
+        </p:txBody>
+      </p:sp>
+      <p:sp>
+        <p:nvSpPr>
+          <p:cNvPr id="6" name="Footer Placeholder 5"/>
+          <p:cNvSpPr>
+            <a:spLocks noGrp="1"/>
+          </p:cNvSpPr>
+          <p:nvPr>
+            <p:ph type="ftr" sz="quarter" idx="4"/>
+          </p:nvPr>
+        </p:nvSpPr>
+        <p:spPr>
+          <a:xfrm>
+            <a:off x="0" y="8685213"/>
+            <a:ext cx="2971800" cy="458787"/>
+          </a:xfrm>
+          <a:prstGeom prst="rect">
+            <a:avLst/>
+          </a:prstGeom>
+        </p:spPr>
+        <p:txBody>
+          <a:bodyPr vert="horz" lIns="91440" tIns="45720" rIns="91440" bIns="45720" rtlCol="0" anchor="b"/>
+          <a:lstStyle>
+            <a:lvl1pPr algn="l">
+              <a:defRPr sz="1200"/>
+            </a:lvl1pPr>
+          </a:lstStyle>
+          <a:p>
+            <a:endParaRPr lang="en-US"/>
+          </a:p>
+        </p:txBody>
+      </p:sp>
+      <p:sp>
+        <p:nvSpPr>
+          <p:cNvPr id="7" name="Slide Number Placeholder 6"/>
+          <p:cNvSpPr>
+            <a:spLocks noGrp="1"/>
+          </p:cNvSpPr>
+          <p:nvPr>
+            <p:ph type="sldNum" sz="quarter" idx="5"/>
+          </p:nvPr>
+        </p:nvSpPr>
+        <p:spPr>
+          <a:xfrm>
+            <a:off x="3884613" y="8685213"/>
+            <a:ext cx="2971800" cy="458787"/>
+          </a:xfrm>
+          <a:prstGeom prst="rect">
+            <a:avLst/>
+          </a:prstGeom>
+        </p:spPr>
+        <p:txBody>
+          <a:bodyPr vert="horz" lIns="91440" tIns="45720" rIns="91440" bIns="45720" rtlCol="0" anchor="b"/>
+          <a:lstStyle>
+            <a:lvl1pPr algn="r">
+              <a:defRPr sz="1200"/>
+            </a:lvl1pPr>
+          </a:lstStyle>
+          <a:p>
+            <a:fld id="{AC4F509A-653A-43AE-BA96-31B00DCE3B99}" type="slidenum">
+              <a:rPr lang="en-US" smtClean="0"/>
+              <a:t>‹#›</a:t>
+            </a:fld>
+            <a:endParaRPr lang="en-US"/>
+          </a:p>
+        </p:txBody>
+      </p:sp>
+    </p:spTree>
+    <p:extLst>
+      <p:ext uri="{BB962C8B-B14F-4D97-AF65-F5344CB8AC3E}">
+        <p14:creationId xmlns:p14="http://schemas.microsoft.com/office/powerpoint/2010/main" val="595158404"/>
+      </p:ext>
+    </p:extLst>
+  </p:cSld>
+  <p:clrMap bg1="lt1" tx1="dk1" bg2="lt2" tx2="dk2" accent1="accent1" accent2="accent2" accent3="accent3" accent4="accent4" accent5="accent5" accent6="accent6" hlink="hlink" folHlink="folHlink"/>
+  <p:notesStyle>
+    <a:lvl1pPr marL="0" algn="l" defTabSz="914400" rtl="0" eaLnBrk="1" latinLnBrk="0" hangingPunct="1">
+      <a:defRPr sz="1200" kern="1200">
+        <a:solidFill>
+          <a:schemeClr val="tx1"/>
+        </a:solidFill>
+        <a:latin typeface="+mn-lt"/>
+        <a:ea typeface="+mn-ea"/>
+        <a:cs typeface="+mn-cs"/>
+      </a:defRPr>
+    </a:lvl1pPr>
+    <a:lvl2pPr marL="457200" algn="l" defTabSz="914400" rtl="0" eaLnBrk="1" latinLnBrk="0" hangingPunct="1">
+      <a:defRPr sz="1200" kern="1200">
+        <a:solidFill>
+          <a:schemeClr val="tx1"/>
+        </a:solidFill>
+        <a:latin typeface="+mn-lt"/>
+        <a:ea typeface="+mn-ea"/>
+        <a:cs typeface="+mn-cs"/>
+      </a:defRPr>
+    </a:lvl2pPr>
+    <a:lvl3pPr marL="914400" algn="l" defTabSz="914400" rtl="0" eaLnBrk="1" latinLnBrk="0" hangingPunct="1">
+      <a:defRPr sz="1200" kern="1200">
+        <a:solidFill>
+          <a:schemeClr val="tx1"/>
+        </a:solidFill>
+        <a:latin typeface="+mn-lt"/>
+        <a:ea typeface="+mn-ea"/>
+        <a:cs typeface="+mn-cs"/>
+      </a:defRPr>
+    </a:lvl3pPr>
+    <a:lvl4pPr marL="1371600" algn="l" defTabSz="914400" rtl="0" eaLnBrk="1" latinLnBrk="0" hangingPunct="1">
+      <a:defRPr sz="1200" kern="1200">
+        <a:solidFill>
+          <a:schemeClr val="tx1"/>
+        </a:solidFill>
+        <a:latin typeface="+mn-lt"/>
+        <a:ea typeface="+mn-ea"/>
+        <a:cs typeface="+mn-cs"/>
+      </a:defRPr>
+    </a:lvl4pPr>
+    <a:lvl5pPr marL="1828800" algn="l" defTabSz="914400" rtl="0" eaLnBrk="1" latinLnBrk="0" hangingPunct="1">
+      <a:defRPr sz="1200" kern="1200">
+        <a:solidFill>
+          <a:schemeClr val="tx1"/>
+        </a:solidFill>
+        <a:latin typeface="+mn-lt"/>
+        <a:ea typeface="+mn-ea"/>
+        <a:cs typeface="+mn-cs"/>
+      </a:defRPr>
+    </a:lvl5pPr>
+    <a:lvl6pPr marL="2286000" algn="l" defTabSz="914400" rtl="0" eaLnBrk="1" latinLnBrk="0" hangingPunct="1">
+      <a:defRPr sz="1200" kern="1200">
+        <a:solidFill>
+          <a:schemeClr val="tx1"/>
+        </a:solidFill>
+        <a:latin typeface="+mn-lt"/>
+        <a:ea typeface="+mn-ea"/>
+        <a:cs typeface="+mn-cs"/>
+      </a:defRPr>
+    </a:lvl6pPr>
+    <a:lvl7pPr marL="2743200" algn="l" defTabSz="914400" rtl="0" eaLnBrk="1" latinLnBrk="0" hangingPunct="1">
+      <a:defRPr sz="1200" kern="1200">
+        <a:solidFill>
+          <a:schemeClr val="tx1"/>
+        </a:solidFill>
+        <a:latin typeface="+mn-lt"/>
+        <a:ea typeface="+mn-ea"/>
+        <a:cs typeface="+mn-cs"/>
+      </a:defRPr>
+    </a:lvl7pPr>
+    <a:lvl8pPr marL="3200400" algn="l" defTabSz="914400" rtl="0" eaLnBrk="1" latinLnBrk="0" hangingPunct="1">
+      <a:defRPr sz="1200" kern="1200">
+        <a:solidFill>
+          <a:schemeClr val="tx1"/>
+        </a:solidFill>
+        <a:latin typeface="+mn-lt"/>
+        <a:ea typeface="+mn-ea"/>
+        <a:cs typeface="+mn-cs"/>
+      </a:defRPr>
+    </a:lvl8pPr>
+    <a:lvl9pPr marL="3657600" algn="l" defTabSz="914400" rtl="0" eaLnBrk="1" latinLnBrk="0" hangingPunct="1">
+      <a:defRPr sz="1200" kern="1200">
+        <a:solidFill>
+          <a:schemeClr val="tx1"/>
+        </a:solidFill>
+        <a:latin typeface="+mn-lt"/>
+        <a:ea typeface="+mn-ea"/>
+        <a:cs typeface="+mn-cs"/>
+      </a:defRPr>
+    </a:lvl9pPr>
+  </p:notesStyle>
+</p:notesMaster>
+</file>
+
+<file path=ppt/notesSlides/notesSlide1.xml><?xml version="1.0" encoding="utf-8"?>
+<p:notes xmlns:a="http://schemas.openxmlformats.org/drawingml/2006/main" xmlns:r="http://schemas.openxmlformats.org/officeDocument/2006/relationships" xmlns:p="http://schemas.openxmlformats.org/presentationml/2006/main">
+  <p:cSld>
+    <p:spTree>
+      <p:nvGrpSpPr>
+        <p:cNvPr id="1" name=""/>
+        <p:cNvGrpSpPr/>
+        <p:nvPr/>
+      </p:nvGrpSpPr>
+      <p:grpSpPr>
+        <a:xfrm>
+          <a:off x="0" y="0"/>
+          <a:ext cx="0" cy="0"/>
+          <a:chOff x="0" y="0"/>
+          <a:chExt cx="0" cy="0"/>
+        </a:xfrm>
+      </p:grpSpPr>
+      <p:sp>
+        <p:nvSpPr>
+          <p:cNvPr id="2" name="Slide Image Placeholder 1"/>
+          <p:cNvSpPr>
+            <a:spLocks noGrp="1" noRot="1" noChangeAspect="1"/>
+          </p:cNvSpPr>
+          <p:nvPr>
+            <p:ph type="sldImg"/>
+          </p:nvPr>
+        </p:nvSpPr>
+        <p:spPr/>
+      </p:sp>
+      <p:sp>
+        <p:nvSpPr>
+          <p:cNvPr id="3" name="Notes Placeholder 2"/>
+          <p:cNvSpPr>
+            <a:spLocks noGrp="1"/>
+          </p:cNvSpPr>
+          <p:nvPr>
+            <p:ph type="body" idx="1"/>
+          </p:nvPr>
+        </p:nvSpPr>
+        <p:spPr/>
+        <p:txBody>
+          <a:bodyPr/>
+          <a:lstStyle/>
+          <a:p>
+            <a:r>
+              <a:rPr lang="en-US" dirty="0"/>
+              <a:t>For smart contract  developers its notoriously difficult to find </a:t>
+            </a:r>
+            <a:r>
+              <a:rPr lang="en-US" dirty="0" err="1"/>
+              <a:t>syutable</a:t>
+            </a:r>
+            <a:r>
+              <a:rPr lang="en-US" dirty="0"/>
+              <a:t> auditors - where are they, how good are they or what is their price.</a:t>
+            </a:r>
+          </a:p>
+          <a:p>
+            <a:endParaRPr lang="en-US" dirty="0"/>
+          </a:p>
+          <a:p>
+            <a:r>
+              <a:rPr lang="en-US" dirty="0" err="1"/>
+              <a:t>theres</a:t>
+            </a:r>
+            <a:r>
+              <a:rPr lang="en-US" dirty="0"/>
+              <a:t> a long and opaque pricing process with zoom meetings</a:t>
+            </a:r>
+          </a:p>
+          <a:p>
+            <a:endParaRPr lang="en-US" dirty="0"/>
+          </a:p>
+          <a:p>
+            <a:r>
+              <a:rPr lang="en-US" dirty="0"/>
+              <a:t>And on top of that the NDAs are often times inconsistent and not standard</a:t>
+            </a:r>
+          </a:p>
+        </p:txBody>
+      </p:sp>
+      <p:sp>
+        <p:nvSpPr>
+          <p:cNvPr id="4" name="Slide Number Placeholder 3"/>
+          <p:cNvSpPr>
+            <a:spLocks noGrp="1"/>
+          </p:cNvSpPr>
+          <p:nvPr>
+            <p:ph type="sldNum" sz="quarter" idx="5"/>
+          </p:nvPr>
+        </p:nvSpPr>
+        <p:spPr/>
+        <p:txBody>
+          <a:bodyPr/>
+          <a:lstStyle/>
+          <a:p>
+            <a:fld id="{AC4F509A-653A-43AE-BA96-31B00DCE3B99}" type="slidenum">
+              <a:rPr lang="en-US" smtClean="0"/>
+              <a:t>2</a:t>
+            </a:fld>
+            <a:endParaRPr lang="en-US"/>
+          </a:p>
+        </p:txBody>
+      </p:sp>
+    </p:spTree>
+    <p:extLst>
+      <p:ext uri="{BB962C8B-B14F-4D97-AF65-F5344CB8AC3E}">
+        <p14:creationId xmlns:p14="http://schemas.microsoft.com/office/powerpoint/2010/main" val="3929857625"/>
+      </p:ext>
+    </p:extLst>
+  </p:cSld>
+  <p:clrMapOvr>
+    <a:masterClrMapping/>
+  </p:clrMapOvr>
+</p:notes>
+</file>
+
+<file path=ppt/notesSlides/notesSlide2.xml><?xml version="1.0" encoding="utf-8"?>
+<p:notes xmlns:a="http://schemas.openxmlformats.org/drawingml/2006/main" xmlns:r="http://schemas.openxmlformats.org/officeDocument/2006/relationships" xmlns:p="http://schemas.openxmlformats.org/presentationml/2006/main">
+  <p:cSld>
+    <p:spTree>
+      <p:nvGrpSpPr>
+        <p:cNvPr id="1" name=""/>
+        <p:cNvGrpSpPr/>
+        <p:nvPr/>
+      </p:nvGrpSpPr>
+      <p:grpSpPr>
+        <a:xfrm>
+          <a:off x="0" y="0"/>
+          <a:ext cx="0" cy="0"/>
+          <a:chOff x="0" y="0"/>
+          <a:chExt cx="0" cy="0"/>
+        </a:xfrm>
+      </p:grpSpPr>
+      <p:sp>
+        <p:nvSpPr>
+          <p:cNvPr id="2" name="Slide Image Placeholder 1"/>
+          <p:cNvSpPr>
+            <a:spLocks noGrp="1" noRot="1" noChangeAspect="1"/>
+          </p:cNvSpPr>
+          <p:nvPr>
+            <p:ph type="sldImg"/>
+          </p:nvPr>
+        </p:nvSpPr>
+        <p:spPr/>
+      </p:sp>
+      <p:sp>
+        <p:nvSpPr>
+          <p:cNvPr id="3" name="Notes Placeholder 2"/>
+          <p:cNvSpPr>
+            <a:spLocks noGrp="1"/>
+          </p:cNvSpPr>
+          <p:nvPr>
+            <p:ph type="body" idx="1"/>
+          </p:nvPr>
+        </p:nvSpPr>
+        <p:spPr/>
+        <p:txBody>
+          <a:bodyPr/>
+          <a:lstStyle/>
+          <a:p>
+            <a:r>
+              <a:rPr lang="en-US" dirty="0"/>
+              <a:t>0xLeague is a decentralized audit marketplace that aims to solve these issues</a:t>
+            </a:r>
+          </a:p>
+          <a:p>
+            <a:endParaRPr lang="en-US" dirty="0"/>
+          </a:p>
+          <a:p>
+            <a:r>
+              <a:rPr lang="en-US" dirty="0"/>
+              <a:t>Clients can browse and filter auditors by score and </a:t>
+            </a:r>
+            <a:r>
+              <a:rPr lang="en-US" dirty="0" err="1"/>
+              <a:t>avil</a:t>
+            </a:r>
+            <a:endParaRPr lang="en-US" dirty="0"/>
+          </a:p>
+          <a:p>
+            <a:r>
+              <a:rPr lang="en-US" dirty="0"/>
+              <a:t>Get quotes and pay on chain</a:t>
+            </a:r>
+          </a:p>
+          <a:p>
+            <a:r>
+              <a:rPr lang="en-US" dirty="0"/>
+              <a:t>And benefit from global standard NDA</a:t>
+            </a:r>
+          </a:p>
+          <a:p>
+            <a:endParaRPr lang="en-US" dirty="0"/>
+          </a:p>
+          <a:p>
+            <a:r>
+              <a:rPr lang="en-US" dirty="0"/>
+              <a:t>Plus, all successful audits </a:t>
+            </a:r>
+            <a:r>
+              <a:rPr lang="en-US" dirty="0" err="1"/>
+              <a:t>reveive</a:t>
+            </a:r>
+            <a:r>
+              <a:rPr lang="en-US" dirty="0"/>
+              <a:t> a personalized security badge as NFT</a:t>
+            </a:r>
+          </a:p>
+        </p:txBody>
+      </p:sp>
+      <p:sp>
+        <p:nvSpPr>
+          <p:cNvPr id="4" name="Slide Number Placeholder 3"/>
+          <p:cNvSpPr>
+            <a:spLocks noGrp="1"/>
+          </p:cNvSpPr>
+          <p:nvPr>
+            <p:ph type="sldNum" sz="quarter" idx="5"/>
+          </p:nvPr>
+        </p:nvSpPr>
+        <p:spPr/>
+        <p:txBody>
+          <a:bodyPr/>
+          <a:lstStyle/>
+          <a:p>
+            <a:fld id="{AC4F509A-653A-43AE-BA96-31B00DCE3B99}" type="slidenum">
+              <a:rPr lang="en-US" smtClean="0"/>
+              <a:t>3</a:t>
+            </a:fld>
+            <a:endParaRPr lang="en-US"/>
+          </a:p>
+        </p:txBody>
+      </p:sp>
+    </p:spTree>
+    <p:extLst>
+      <p:ext uri="{BB962C8B-B14F-4D97-AF65-F5344CB8AC3E}">
+        <p14:creationId xmlns:p14="http://schemas.microsoft.com/office/powerpoint/2010/main" val="1359520837"/>
+      </p:ext>
+    </p:extLst>
+  </p:cSld>
+  <p:clrMapOvr>
+    <a:masterClrMapping/>
+  </p:clrMapOvr>
+</p:notes>
+</file>
+
+<file path=ppt/notesSlides/notesSlide3.xml><?xml version="1.0" encoding="utf-8"?>
+<p:notes xmlns:a="http://schemas.openxmlformats.org/drawingml/2006/main" xmlns:r="http://schemas.openxmlformats.org/officeDocument/2006/relationships" xmlns:p="http://schemas.openxmlformats.org/presentationml/2006/main">
+  <p:cSld>
+    <p:spTree>
+      <p:nvGrpSpPr>
+        <p:cNvPr id="1" name=""/>
+        <p:cNvGrpSpPr/>
+        <p:nvPr/>
+      </p:nvGrpSpPr>
+      <p:grpSpPr>
+        <a:xfrm>
+          <a:off x="0" y="0"/>
+          <a:ext cx="0" cy="0"/>
+          <a:chOff x="0" y="0"/>
+          <a:chExt cx="0" cy="0"/>
+        </a:xfrm>
+      </p:grpSpPr>
+      <p:sp>
+        <p:nvSpPr>
+          <p:cNvPr id="2" name="Slide Image Placeholder 1"/>
+          <p:cNvSpPr>
+            <a:spLocks noGrp="1" noRot="1" noChangeAspect="1"/>
+          </p:cNvSpPr>
+          <p:nvPr>
+            <p:ph type="sldImg"/>
+          </p:nvPr>
+        </p:nvSpPr>
+        <p:spPr/>
+      </p:sp>
+      <p:sp>
+        <p:nvSpPr>
+          <p:cNvPr id="3" name="Notes Placeholder 2"/>
+          <p:cNvSpPr>
+            <a:spLocks noGrp="1"/>
+          </p:cNvSpPr>
+          <p:nvPr>
+            <p:ph type="body" idx="1"/>
+          </p:nvPr>
+        </p:nvSpPr>
+        <p:spPr/>
+        <p:txBody>
+          <a:bodyPr/>
+          <a:lstStyle/>
+          <a:p>
+            <a:endParaRPr lang="en-US" dirty="0"/>
+          </a:p>
+        </p:txBody>
+      </p:sp>
+      <p:sp>
+        <p:nvSpPr>
+          <p:cNvPr id="4" name="Slide Number Placeholder 3"/>
+          <p:cNvSpPr>
+            <a:spLocks noGrp="1"/>
+          </p:cNvSpPr>
+          <p:nvPr>
+            <p:ph type="sldNum" sz="quarter" idx="5"/>
+          </p:nvPr>
+        </p:nvSpPr>
+        <p:spPr/>
+        <p:txBody>
+          <a:bodyPr/>
+          <a:lstStyle/>
+          <a:p>
+            <a:fld id="{AC4F509A-653A-43AE-BA96-31B00DCE3B99}" type="slidenum">
+              <a:rPr lang="en-US" smtClean="0"/>
+              <a:t>4</a:t>
+            </a:fld>
+            <a:endParaRPr lang="en-US"/>
+          </a:p>
+        </p:txBody>
+      </p:sp>
+    </p:spTree>
+    <p:extLst>
+      <p:ext uri="{BB962C8B-B14F-4D97-AF65-F5344CB8AC3E}">
+        <p14:creationId xmlns:p14="http://schemas.microsoft.com/office/powerpoint/2010/main" val="2981388602"/>
+      </p:ext>
+    </p:extLst>
+  </p:cSld>
+  <p:clrMapOvr>
+    <a:masterClrMapping/>
+  </p:clrMapOvr>
+</p:notes>
+</file>
+
+<file path=ppt/notesSlides/notesSlide4.xml><?xml version="1.0" encoding="utf-8"?>
+<p:notes xmlns:a="http://schemas.openxmlformats.org/drawingml/2006/main" xmlns:r="http://schemas.openxmlformats.org/officeDocument/2006/relationships" xmlns:p="http://schemas.openxmlformats.org/presentationml/2006/main">
+  <p:cSld>
+    <p:spTree>
+      <p:nvGrpSpPr>
+        <p:cNvPr id="1" name=""/>
+        <p:cNvGrpSpPr/>
+        <p:nvPr/>
+      </p:nvGrpSpPr>
+      <p:grpSpPr>
+        <a:xfrm>
+          <a:off x="0" y="0"/>
+          <a:ext cx="0" cy="0"/>
+          <a:chOff x="0" y="0"/>
+          <a:chExt cx="0" cy="0"/>
+        </a:xfrm>
+      </p:grpSpPr>
+      <p:sp>
+        <p:nvSpPr>
+          <p:cNvPr id="2" name="Slide Image Placeholder 1"/>
+          <p:cNvSpPr>
+            <a:spLocks noGrp="1" noRot="1" noChangeAspect="1"/>
+          </p:cNvSpPr>
+          <p:nvPr>
+            <p:ph type="sldImg"/>
+          </p:nvPr>
+        </p:nvSpPr>
+        <p:spPr/>
+      </p:sp>
+      <p:sp>
+        <p:nvSpPr>
+          <p:cNvPr id="3" name="Notes Placeholder 2"/>
+          <p:cNvSpPr>
+            <a:spLocks noGrp="1"/>
+          </p:cNvSpPr>
+          <p:nvPr>
+            <p:ph type="body" idx="1"/>
+          </p:nvPr>
+        </p:nvSpPr>
+        <p:spPr/>
+        <p:txBody>
+          <a:bodyPr/>
+          <a:lstStyle/>
+          <a:p>
+            <a:endParaRPr lang="en-US" dirty="0"/>
+          </a:p>
+        </p:txBody>
+      </p:sp>
+      <p:sp>
+        <p:nvSpPr>
+          <p:cNvPr id="4" name="Slide Number Placeholder 3"/>
+          <p:cNvSpPr>
+            <a:spLocks noGrp="1"/>
+          </p:cNvSpPr>
+          <p:nvPr>
+            <p:ph type="sldNum" sz="quarter" idx="5"/>
+          </p:nvPr>
+        </p:nvSpPr>
+        <p:spPr/>
+        <p:txBody>
+          <a:bodyPr/>
+          <a:lstStyle/>
+          <a:p>
+            <a:fld id="{AC4F509A-653A-43AE-BA96-31B00DCE3B99}" type="slidenum">
+              <a:rPr lang="en-US" smtClean="0"/>
+              <a:t>5</a:t>
+            </a:fld>
+            <a:endParaRPr lang="en-US"/>
+          </a:p>
+        </p:txBody>
+      </p:sp>
+    </p:spTree>
+    <p:extLst>
+      <p:ext uri="{BB962C8B-B14F-4D97-AF65-F5344CB8AC3E}">
+        <p14:creationId xmlns:p14="http://schemas.microsoft.com/office/powerpoint/2010/main" val="401534218"/>
+      </p:ext>
+    </p:extLst>
+  </p:cSld>
+  <p:clrMapOvr>
+    <a:masterClrMapping/>
+  </p:clrMapOvr>
+</p:notes>
 </file>
 
 <file path=ppt/slideLayouts/slideLayout1.xml><?xml version="1.0" encoding="utf-8"?>
@@ -3469,7 +4239,11 @@
           <a:p>
             <a:r>
               <a:rPr lang="en-US" dirty="0"/>
-              <a:t>Problems with smart-contract auditing</a:t>
+              <a:t>Problems with </a:t>
+            </a:r>
+            <a:r>
+              <a:rPr lang="en-US" b="1" dirty="0"/>
+              <a:t>smart-contract auditing</a:t>
             </a:r>
           </a:p>
         </p:txBody>
@@ -3680,7 +4454,7 @@
           <a:p>
             <a:r>
               <a:rPr lang="en-US" dirty="0"/>
-              <a:t>Opaque pricing process</a:t>
+              <a:t>Long &amp; opaque pricing process</a:t>
             </a:r>
           </a:p>
           <a:p>
@@ -3688,15 +4462,6 @@
               <a:rPr lang="en-US" dirty="0"/>
               <a:t>Inconsistent NDAs</a:t>
             </a:r>
-          </a:p>
-          <a:p>
-            <a:r>
-              <a:rPr lang="en-US" dirty="0"/>
-              <a:t>Centralized audit marketplaces</a:t>
-            </a:r>
-          </a:p>
-          <a:p>
-            <a:endParaRPr lang="en-US" dirty="0"/>
           </a:p>
           <a:p>
             <a:endParaRPr lang="en-US" dirty="0"/>
@@ -3796,17 +4561,14 @@
           <a:p>
             <a:r>
               <a:rPr lang="en-US" dirty="0"/>
-              <a:t>Standard pre-signed NDA</a:t>
+              <a:t>Open and public process</a:t>
             </a:r>
           </a:p>
           <a:p>
             <a:r>
               <a:rPr lang="en-US" dirty="0"/>
-              <a:t>Open decentralized platform</a:t>
-            </a:r>
-          </a:p>
-          <a:p>
-            <a:endParaRPr lang="en-US" dirty="0"/>
+              <a:t>Standard global pre-signed NDA</a:t>
+            </a:r>
           </a:p>
         </p:txBody>
       </p:sp>
@@ -3825,7 +4587,7 @@
           <p:nvPr/>
         </p:nvPicPr>
         <p:blipFill>
-          <a:blip r:embed="rId2">
+          <a:blip r:embed="rId3">
             <a:extLst>
               <a:ext uri="{28A0092B-C50C-407E-A947-70E740481C1C}">
                 <a14:useLocalDpi xmlns:a14="http://schemas.microsoft.com/office/drawing/2010/main" val="0"/>
@@ -3838,8 +4600,8 @@
         </p:blipFill>
         <p:spPr>
           <a:xfrm>
-            <a:off x="8854068" y="5268392"/>
-            <a:ext cx="2765737" cy="1335183"/>
+            <a:off x="8620830" y="4606620"/>
+            <a:ext cx="3252854" cy="1570343"/>
           </a:xfrm>
           <a:prstGeom prst="rect">
             <a:avLst/>
@@ -3862,7 +4624,7 @@
         </p:nvSpPr>
         <p:spPr>
           <a:xfrm>
-            <a:off x="838200" y="4001294"/>
+            <a:off x="838200" y="3942829"/>
             <a:ext cx="10515600" cy="1325563"/>
           </a:xfrm>
           <a:prstGeom prst="rect">
@@ -3895,7 +4657,7 @@
           <a:p>
             <a:r>
               <a:rPr lang="en-US" dirty="0"/>
-              <a:t>Bonus: receive audit security badge as NFT</a:t>
+              <a:t>Bonus: receive security badge as NFT</a:t>
             </a:r>
           </a:p>
         </p:txBody>
@@ -3904,6 +4666,610 @@
     <p:extLst>
       <p:ext uri="{BB962C8B-B14F-4D97-AF65-F5344CB8AC3E}">
         <p14:creationId xmlns:p14="http://schemas.microsoft.com/office/powerpoint/2010/main" val="3161798756"/>
+      </p:ext>
+    </p:extLst>
+  </p:cSld>
+  <p:clrMapOvr>
+    <a:masterClrMapping/>
+  </p:clrMapOvr>
+  <p:timing>
+    <p:tnLst>
+      <p:par>
+        <p:cTn id="1" dur="indefinite" restart="never" nodeType="tmRoot">
+          <p:childTnLst>
+            <p:seq concurrent="1" nextAc="seek">
+              <p:cTn id="2" dur="indefinite" nodeType="mainSeq">
+                <p:childTnLst>
+                  <p:par>
+                    <p:cTn id="3" fill="hold">
+                      <p:stCondLst>
+                        <p:cond delay="indefinite"/>
+                      </p:stCondLst>
+                      <p:childTnLst>
+                        <p:par>
+                          <p:cTn id="4" fill="hold">
+                            <p:stCondLst>
+                              <p:cond delay="0"/>
+                            </p:stCondLst>
+                            <p:childTnLst>
+                              <p:par>
+                                <p:cTn id="5" presetID="1" presetClass="entr" presetSubtype="0" fill="hold" grpId="0" nodeType="clickEffect">
+                                  <p:stCondLst>
+                                    <p:cond delay="0"/>
+                                  </p:stCondLst>
+                                  <p:childTnLst>
+                                    <p:set>
+                                      <p:cBhvr>
+                                        <p:cTn id="6" dur="1" fill="hold">
+                                          <p:stCondLst>
+                                            <p:cond delay="0"/>
+                                          </p:stCondLst>
+                                        </p:cTn>
+                                        <p:tgtEl>
+                                          <p:spTgt spid="5"/>
+                                        </p:tgtEl>
+                                        <p:attrNameLst>
+                                          <p:attrName>style.visibility</p:attrName>
+                                        </p:attrNameLst>
+                                      </p:cBhvr>
+                                      <p:to>
+                                        <p:strVal val="visible"/>
+                                      </p:to>
+                                    </p:set>
+                                  </p:childTnLst>
+                                </p:cTn>
+                              </p:par>
+                            </p:childTnLst>
+                          </p:cTn>
+                        </p:par>
+                      </p:childTnLst>
+                    </p:cTn>
+                  </p:par>
+                </p:childTnLst>
+              </p:cTn>
+              <p:prevCondLst>
+                <p:cond evt="onPrev" delay="0">
+                  <p:tgtEl>
+                    <p:sldTgt/>
+                  </p:tgtEl>
+                </p:cond>
+              </p:prevCondLst>
+              <p:nextCondLst>
+                <p:cond evt="onNext" delay="0">
+                  <p:tgtEl>
+                    <p:sldTgt/>
+                  </p:tgtEl>
+                </p:cond>
+              </p:nextCondLst>
+            </p:seq>
+          </p:childTnLst>
+        </p:cTn>
+      </p:par>
+    </p:tnLst>
+    <p:bldLst>
+      <p:bldP spid="5" grpId="0"/>
+    </p:bldLst>
+  </p:timing>
+</p:sld>
+</file>
+
+<file path=ppt/slides/slide4.xml><?xml version="1.0" encoding="utf-8"?>
+<p:sld xmlns:a="http://schemas.openxmlformats.org/drawingml/2006/main" xmlns:r="http://schemas.openxmlformats.org/officeDocument/2006/relationships" xmlns:p="http://schemas.openxmlformats.org/presentationml/2006/main">
+  <p:cSld>
+    <p:spTree>
+      <p:nvGrpSpPr>
+        <p:cNvPr id="1" name=""/>
+        <p:cNvGrpSpPr/>
+        <p:nvPr/>
+      </p:nvGrpSpPr>
+      <p:grpSpPr>
+        <a:xfrm>
+          <a:off x="0" y="0"/>
+          <a:ext cx="0" cy="0"/>
+          <a:chOff x="0" y="0"/>
+          <a:chExt cx="0" cy="0"/>
+        </a:xfrm>
+      </p:grpSpPr>
+      <p:pic>
+        <p:nvPicPr>
+          <p:cNvPr id="10" name="Picture 9">
+            <a:extLst>
+              <a:ext uri="{FF2B5EF4-FFF2-40B4-BE49-F238E27FC236}">
+                <a16:creationId xmlns:a16="http://schemas.microsoft.com/office/drawing/2014/main" id="{43C5CD9A-0DA7-9F28-6E0A-E6DF2F022503}"/>
+              </a:ext>
+            </a:extLst>
+          </p:cNvPr>
+          <p:cNvPicPr>
+            <a:picLocks noChangeAspect="1"/>
+          </p:cNvPicPr>
+          <p:nvPr/>
+        </p:nvPicPr>
+        <p:blipFill>
+          <a:blip r:embed="rId3"/>
+          <a:stretch>
+            <a:fillRect/>
+          </a:stretch>
+        </p:blipFill>
+        <p:spPr>
+          <a:xfrm>
+            <a:off x="2005118" y="4345349"/>
+            <a:ext cx="10457269" cy="1201316"/>
+          </a:xfrm>
+          <a:prstGeom prst="rect">
+            <a:avLst/>
+          </a:prstGeom>
+        </p:spPr>
+      </p:pic>
+      <p:pic>
+        <p:nvPicPr>
+          <p:cNvPr id="9" name="Picture 8">
+            <a:extLst>
+              <a:ext uri="{FF2B5EF4-FFF2-40B4-BE49-F238E27FC236}">
+                <a16:creationId xmlns:a16="http://schemas.microsoft.com/office/drawing/2014/main" id="{795EA32C-489F-A6CB-9110-AE8A3D358375}"/>
+              </a:ext>
+            </a:extLst>
+          </p:cNvPr>
+          <p:cNvPicPr>
+            <a:picLocks noChangeAspect="1"/>
+          </p:cNvPicPr>
+          <p:nvPr/>
+        </p:nvPicPr>
+        <p:blipFill>
+          <a:blip r:embed="rId3"/>
+          <a:stretch>
+            <a:fillRect/>
+          </a:stretch>
+        </p:blipFill>
+        <p:spPr>
+          <a:xfrm>
+            <a:off x="1734731" y="5585223"/>
+            <a:ext cx="10457269" cy="1272777"/>
+          </a:xfrm>
+          <a:prstGeom prst="rect">
+            <a:avLst/>
+          </a:prstGeom>
+        </p:spPr>
+      </p:pic>
+      <p:sp>
+        <p:nvSpPr>
+          <p:cNvPr id="2" name="Title 1">
+            <a:extLst>
+              <a:ext uri="{FF2B5EF4-FFF2-40B4-BE49-F238E27FC236}">
+                <a16:creationId xmlns:a16="http://schemas.microsoft.com/office/drawing/2014/main" id="{C594B150-1996-71BC-29BC-A31536887F97}"/>
+              </a:ext>
+            </a:extLst>
+          </p:cNvPr>
+          <p:cNvSpPr>
+            <a:spLocks noGrp="1"/>
+          </p:cNvSpPr>
+          <p:nvPr>
+            <p:ph type="title"/>
+          </p:nvPr>
+        </p:nvSpPr>
+        <p:spPr/>
+        <p:txBody>
+          <a:bodyPr/>
+          <a:lstStyle/>
+          <a:p>
+            <a:r>
+              <a:rPr lang="en-US" dirty="0"/>
+              <a:t>How was it built</a:t>
+            </a:r>
+          </a:p>
+        </p:txBody>
+      </p:sp>
+      <p:sp>
+        <p:nvSpPr>
+          <p:cNvPr id="3" name="Content Placeholder 2">
+            <a:extLst>
+              <a:ext uri="{FF2B5EF4-FFF2-40B4-BE49-F238E27FC236}">
+                <a16:creationId xmlns:a16="http://schemas.microsoft.com/office/drawing/2014/main" id="{F4E3A4ED-893F-38ED-CD6B-47CBB6E2E6E9}"/>
+              </a:ext>
+            </a:extLst>
+          </p:cNvPr>
+          <p:cNvSpPr>
+            <a:spLocks noGrp="1"/>
+          </p:cNvSpPr>
+          <p:nvPr>
+            <p:ph idx="1"/>
+          </p:nvPr>
+        </p:nvSpPr>
+        <p:spPr/>
+        <p:txBody>
+          <a:bodyPr>
+            <a:normAutofit/>
+          </a:bodyPr>
+          <a:lstStyle/>
+          <a:p>
+            <a:r>
+              <a:rPr lang="en-US" sz="2400" dirty="0"/>
+              <a:t>Toolblox no-code platform</a:t>
+            </a:r>
+          </a:p>
+          <a:p>
+            <a:pPr lvl="1"/>
+            <a:r>
+              <a:rPr lang="en-US" sz="2000" dirty="0"/>
+              <a:t>No-code smart contract &amp; </a:t>
+            </a:r>
+            <a:r>
+              <a:rPr lang="en-US" sz="2000" dirty="0" err="1"/>
+              <a:t>dApp</a:t>
+            </a:r>
+            <a:r>
+              <a:rPr lang="en-US" sz="2000" dirty="0"/>
+              <a:t> builder</a:t>
+            </a:r>
+          </a:p>
+          <a:p>
+            <a:pPr lvl="1"/>
+            <a:r>
+              <a:rPr lang="en-US" sz="2000" dirty="0"/>
+              <a:t>Auto-generated dashboard</a:t>
+            </a:r>
+          </a:p>
+          <a:p>
+            <a:r>
+              <a:rPr lang="en-US" sz="2400" dirty="0"/>
+              <a:t>2 smart contracts</a:t>
+            </a:r>
+          </a:p>
+          <a:p>
+            <a:pPr lvl="1"/>
+            <a:r>
+              <a:rPr lang="en-US" sz="2000" dirty="0"/>
+              <a:t>Profile management</a:t>
+            </a:r>
+          </a:p>
+          <a:p>
+            <a:pPr lvl="1"/>
+            <a:r>
+              <a:rPr lang="en-US" sz="2000" dirty="0"/>
+              <a:t>Audit management</a:t>
+            </a:r>
+          </a:p>
+        </p:txBody>
+      </p:sp>
+      <p:pic>
+        <p:nvPicPr>
+          <p:cNvPr id="5" name="Picture 4">
+            <a:extLst>
+              <a:ext uri="{FF2B5EF4-FFF2-40B4-BE49-F238E27FC236}">
+                <a16:creationId xmlns:a16="http://schemas.microsoft.com/office/drawing/2014/main" id="{30D222E5-A084-1792-800F-97CC0E791818}"/>
+              </a:ext>
+            </a:extLst>
+          </p:cNvPr>
+          <p:cNvPicPr>
+            <a:picLocks noChangeAspect="1"/>
+          </p:cNvPicPr>
+          <p:nvPr/>
+        </p:nvPicPr>
+        <p:blipFill>
+          <a:blip r:embed="rId3"/>
+          <a:stretch>
+            <a:fillRect/>
+          </a:stretch>
+        </p:blipFill>
+        <p:spPr>
+          <a:xfrm>
+            <a:off x="1574957" y="4333211"/>
+            <a:ext cx="10457269" cy="1213453"/>
+          </a:xfrm>
+          <a:prstGeom prst="rect">
+            <a:avLst/>
+          </a:prstGeom>
+        </p:spPr>
+      </p:pic>
+      <p:pic>
+        <p:nvPicPr>
+          <p:cNvPr id="7" name="Picture 6">
+            <a:extLst>
+              <a:ext uri="{FF2B5EF4-FFF2-40B4-BE49-F238E27FC236}">
+                <a16:creationId xmlns:a16="http://schemas.microsoft.com/office/drawing/2014/main" id="{1C59E1B2-D082-722B-6DDF-0AFD43150D2D}"/>
+              </a:ext>
+            </a:extLst>
+          </p:cNvPr>
+          <p:cNvPicPr>
+            <a:picLocks noChangeAspect="1"/>
+          </p:cNvPicPr>
+          <p:nvPr/>
+        </p:nvPicPr>
+        <p:blipFill>
+          <a:blip r:embed="rId4"/>
+          <a:stretch>
+            <a:fillRect/>
+          </a:stretch>
+        </p:blipFill>
+        <p:spPr>
+          <a:xfrm>
+            <a:off x="1574957" y="5585223"/>
+            <a:ext cx="9632120" cy="1272777"/>
+          </a:xfrm>
+          <a:prstGeom prst="rect">
+            <a:avLst/>
+          </a:prstGeom>
+        </p:spPr>
+      </p:pic>
+    </p:spTree>
+    <p:extLst>
+      <p:ext uri="{BB962C8B-B14F-4D97-AF65-F5344CB8AC3E}">
+        <p14:creationId xmlns:p14="http://schemas.microsoft.com/office/powerpoint/2010/main" val="1283086502"/>
+      </p:ext>
+    </p:extLst>
+  </p:cSld>
+  <p:clrMapOvr>
+    <a:masterClrMapping/>
+  </p:clrMapOvr>
+</p:sld>
+</file>
+
+<file path=ppt/slides/slide5.xml><?xml version="1.0" encoding="utf-8"?>
+<p:sld xmlns:a="http://schemas.openxmlformats.org/drawingml/2006/main" xmlns:r="http://schemas.openxmlformats.org/officeDocument/2006/relationships" xmlns:p="http://schemas.openxmlformats.org/presentationml/2006/main">
+  <p:cSld>
+    <p:spTree>
+      <p:nvGrpSpPr>
+        <p:cNvPr id="1" name=""/>
+        <p:cNvGrpSpPr/>
+        <p:nvPr/>
+      </p:nvGrpSpPr>
+      <p:grpSpPr>
+        <a:xfrm>
+          <a:off x="0" y="0"/>
+          <a:ext cx="0" cy="0"/>
+          <a:chOff x="0" y="0"/>
+          <a:chExt cx="0" cy="0"/>
+        </a:xfrm>
+      </p:grpSpPr>
+      <p:pic>
+        <p:nvPicPr>
+          <p:cNvPr id="6" name="Picture 5" descr="A person in a black shirt&#10;&#10;Description automatically generated">
+            <a:extLst>
+              <a:ext uri="{FF2B5EF4-FFF2-40B4-BE49-F238E27FC236}">
+                <a16:creationId xmlns:a16="http://schemas.microsoft.com/office/drawing/2014/main" id="{C03DB289-6869-D0FF-5FA3-43F78A482803}"/>
+              </a:ext>
+            </a:extLst>
+          </p:cNvPr>
+          <p:cNvPicPr>
+            <a:picLocks noChangeAspect="1"/>
+          </p:cNvPicPr>
+          <p:nvPr/>
+        </p:nvPicPr>
+        <p:blipFill>
+          <a:blip r:embed="rId3">
+            <a:extLst>
+              <a:ext uri="{28A0092B-C50C-407E-A947-70E740481C1C}">
+                <a14:useLocalDpi xmlns:a14="http://schemas.microsoft.com/office/drawing/2010/main" val="0"/>
+              </a:ext>
+            </a:extLst>
+          </a:blip>
+          <a:stretch>
+            <a:fillRect/>
+          </a:stretch>
+        </p:blipFill>
+        <p:spPr>
+          <a:xfrm>
+            <a:off x="1095101" y="1595631"/>
+            <a:ext cx="1628505" cy="1628505"/>
+          </a:xfrm>
+          <a:prstGeom prst="rect">
+            <a:avLst/>
+          </a:prstGeom>
+        </p:spPr>
+      </p:pic>
+      <p:sp>
+        <p:nvSpPr>
+          <p:cNvPr id="2" name="Title 1">
+            <a:extLst>
+              <a:ext uri="{FF2B5EF4-FFF2-40B4-BE49-F238E27FC236}">
+                <a16:creationId xmlns:a16="http://schemas.microsoft.com/office/drawing/2014/main" id="{91B51B60-55DE-C951-5A14-946A63714451}"/>
+              </a:ext>
+            </a:extLst>
+          </p:cNvPr>
+          <p:cNvSpPr>
+            <a:spLocks noGrp="1"/>
+          </p:cNvSpPr>
+          <p:nvPr>
+            <p:ph type="title"/>
+          </p:nvPr>
+        </p:nvSpPr>
+        <p:spPr/>
+        <p:txBody>
+          <a:bodyPr/>
+          <a:lstStyle/>
+          <a:p>
+            <a:r>
+              <a:rPr lang="en-US" dirty="0"/>
+              <a:t>Team</a:t>
+            </a:r>
+          </a:p>
+        </p:txBody>
+      </p:sp>
+      <p:sp>
+        <p:nvSpPr>
+          <p:cNvPr id="3" name="Content Placeholder 2">
+            <a:extLst>
+              <a:ext uri="{FF2B5EF4-FFF2-40B4-BE49-F238E27FC236}">
+                <a16:creationId xmlns:a16="http://schemas.microsoft.com/office/drawing/2014/main" id="{589E13CC-5D29-E6BD-7A2A-6EF6AC1EDC39}"/>
+              </a:ext>
+            </a:extLst>
+          </p:cNvPr>
+          <p:cNvSpPr>
+            <a:spLocks noGrp="1"/>
+          </p:cNvSpPr>
+          <p:nvPr>
+            <p:ph idx="1"/>
+          </p:nvPr>
+        </p:nvSpPr>
+        <p:spPr>
+          <a:xfrm>
+            <a:off x="838200" y="3429000"/>
+            <a:ext cx="10515600" cy="1570343"/>
+          </a:xfrm>
+        </p:spPr>
+        <p:txBody>
+          <a:bodyPr/>
+          <a:lstStyle/>
+          <a:p>
+            <a:r>
+              <a:rPr lang="en-US" dirty="0"/>
+              <a:t>Silver Sepp</a:t>
+            </a:r>
+          </a:p>
+          <a:p>
+            <a:r>
+              <a:rPr lang="en-US" dirty="0">
+                <a:hlinkClick r:id="rId4"/>
+              </a:rPr>
+              <a:t>https://www.linkedin.com/in/silver-sepp-59413a5/</a:t>
+            </a:r>
+            <a:r>
+              <a:rPr lang="en-US" dirty="0"/>
+              <a:t> </a:t>
+            </a:r>
+          </a:p>
+        </p:txBody>
+      </p:sp>
+      <p:pic>
+        <p:nvPicPr>
+          <p:cNvPr id="4" name="Content Placeholder 8" descr="A blue and white sign&#10;&#10;Description automatically generated">
+            <a:extLst>
+              <a:ext uri="{FF2B5EF4-FFF2-40B4-BE49-F238E27FC236}">
+                <a16:creationId xmlns:a16="http://schemas.microsoft.com/office/drawing/2014/main" id="{143E7E6D-9466-1C6C-B2C2-7E75DE23DAE8}"/>
+              </a:ext>
+            </a:extLst>
+          </p:cNvPr>
+          <p:cNvPicPr>
+            <a:picLocks noChangeAspect="1"/>
+          </p:cNvPicPr>
+          <p:nvPr/>
+        </p:nvPicPr>
+        <p:blipFill>
+          <a:blip r:embed="rId5">
+            <a:extLst>
+              <a:ext uri="{28A0092B-C50C-407E-A947-70E740481C1C}">
+                <a14:useLocalDpi xmlns:a14="http://schemas.microsoft.com/office/drawing/2010/main" val="0"/>
+              </a:ext>
+            </a:extLst>
+          </a:blip>
+          <a:stretch>
+            <a:fillRect/>
+          </a:stretch>
+        </p:blipFill>
+        <p:spPr>
+          <a:xfrm>
+            <a:off x="8620830" y="4606620"/>
+            <a:ext cx="3252854" cy="1570343"/>
+          </a:xfrm>
+          <a:prstGeom prst="rect">
+            <a:avLst/>
+          </a:prstGeom>
+        </p:spPr>
+      </p:pic>
+    </p:spTree>
+    <p:extLst>
+      <p:ext uri="{BB962C8B-B14F-4D97-AF65-F5344CB8AC3E}">
+        <p14:creationId xmlns:p14="http://schemas.microsoft.com/office/powerpoint/2010/main" val="3375863920"/>
+      </p:ext>
+    </p:extLst>
+  </p:cSld>
+  <p:clrMapOvr>
+    <a:masterClrMapping/>
+  </p:clrMapOvr>
+</p:sld>
+</file>
+
+<file path=ppt/slides/slide6.xml><?xml version="1.0" encoding="utf-8"?>
+<p:sld xmlns:a="http://schemas.openxmlformats.org/drawingml/2006/main" xmlns:r="http://schemas.openxmlformats.org/officeDocument/2006/relationships" xmlns:p="http://schemas.openxmlformats.org/presentationml/2006/main">
+  <p:cSld>
+    <p:spTree>
+      <p:nvGrpSpPr>
+        <p:cNvPr id="1" name=""/>
+        <p:cNvGrpSpPr/>
+        <p:nvPr/>
+      </p:nvGrpSpPr>
+      <p:grpSpPr>
+        <a:xfrm>
+          <a:off x="0" y="0"/>
+          <a:ext cx="0" cy="0"/>
+          <a:chOff x="0" y="0"/>
+          <a:chExt cx="0" cy="0"/>
+        </a:xfrm>
+      </p:grpSpPr>
+      <p:sp>
+        <p:nvSpPr>
+          <p:cNvPr id="3" name="Subtitle 2">
+            <a:extLst>
+              <a:ext uri="{FF2B5EF4-FFF2-40B4-BE49-F238E27FC236}">
+                <a16:creationId xmlns:a16="http://schemas.microsoft.com/office/drawing/2014/main" id="{3D03764E-650E-9896-3289-1BB2D8C091CD}"/>
+              </a:ext>
+            </a:extLst>
+          </p:cNvPr>
+          <p:cNvSpPr>
+            <a:spLocks noGrp="1"/>
+          </p:cNvSpPr>
+          <p:nvPr>
+            <p:ph type="subTitle" idx="1"/>
+          </p:nvPr>
+        </p:nvSpPr>
+        <p:spPr>
+          <a:xfrm>
+            <a:off x="1524000" y="4996673"/>
+            <a:ext cx="9144000" cy="1655762"/>
+          </a:xfrm>
+        </p:spPr>
+        <p:txBody>
+          <a:bodyPr>
+            <a:normAutofit/>
+          </a:bodyPr>
+          <a:lstStyle/>
+          <a:p>
+            <a:r>
+              <a:rPr lang="en-US" sz="6000" dirty="0"/>
+              <a:t>Thank you!</a:t>
+            </a:r>
+          </a:p>
+        </p:txBody>
+      </p:sp>
+      <p:pic>
+        <p:nvPicPr>
+          <p:cNvPr id="5" name="Picture 4" descr="A blue and white sign&#10;&#10;Description automatically generated">
+            <a:extLst>
+              <a:ext uri="{FF2B5EF4-FFF2-40B4-BE49-F238E27FC236}">
+                <a16:creationId xmlns:a16="http://schemas.microsoft.com/office/drawing/2014/main" id="{BA63C89D-8711-40F4-9999-B4B9E6498E31}"/>
+              </a:ext>
+            </a:extLst>
+          </p:cNvPr>
+          <p:cNvPicPr>
+            <a:picLocks noChangeAspect="1"/>
+          </p:cNvPicPr>
+          <p:nvPr/>
+        </p:nvPicPr>
+        <p:blipFill>
+          <a:blip r:embed="rId2">
+            <a:extLst>
+              <a:ext uri="{28A0092B-C50C-407E-A947-70E740481C1C}">
+                <a14:useLocalDpi xmlns:a14="http://schemas.microsoft.com/office/drawing/2010/main" val="0"/>
+              </a:ext>
+            </a:extLst>
+          </a:blip>
+          <a:stretch>
+            <a:fillRect/>
+          </a:stretch>
+        </p:blipFill>
+        <p:spPr>
+          <a:xfrm>
+            <a:off x="2851846" y="1743130"/>
+            <a:ext cx="6488308" cy="3132286"/>
+          </a:xfrm>
+          <a:prstGeom prst="rect">
+            <a:avLst/>
+          </a:prstGeom>
+        </p:spPr>
+      </p:pic>
+    </p:spTree>
+    <p:extLst>
+      <p:ext uri="{BB962C8B-B14F-4D97-AF65-F5344CB8AC3E}">
+        <p14:creationId xmlns:p14="http://schemas.microsoft.com/office/powerpoint/2010/main" val="140064151"/>
       </p:ext>
     </p:extLst>
   </p:cSld>
@@ -4206,4 +5572,299 @@
     </a:ext>
   </a:extLst>
 </a:theme>
+</file>
+
+<file path=ppt/theme/theme2.xml><?xml version="1.0" encoding="utf-8"?>
+<a:theme xmlns:a="http://schemas.openxmlformats.org/drawingml/2006/main" name="Office Theme">
+  <a:themeElements>
+    <a:clrScheme name="Office">
+      <a:dk1>
+        <a:sysClr val="windowText" lastClr="000000"/>
+      </a:dk1>
+      <a:lt1>
+        <a:sysClr val="window" lastClr="FFFFFF"/>
+      </a:lt1>
+      <a:dk2>
+        <a:srgbClr val="44546A"/>
+      </a:dk2>
+      <a:lt2>
+        <a:srgbClr val="E7E6E6"/>
+      </a:lt2>
+      <a:accent1>
+        <a:srgbClr val="4472C4"/>
+      </a:accent1>
+      <a:accent2>
+        <a:srgbClr val="ED7D31"/>
+      </a:accent2>
+      <a:accent3>
+        <a:srgbClr val="A5A5A5"/>
+      </a:accent3>
+      <a:accent4>
+        <a:srgbClr val="FFC000"/>
+      </a:accent4>
+      <a:accent5>
+        <a:srgbClr val="5B9BD5"/>
+      </a:accent5>
+      <a:accent6>
+        <a:srgbClr val="70AD47"/>
+      </a:accent6>
+      <a:hlink>
+        <a:srgbClr val="0563C1"/>
+      </a:hlink>
+      <a:folHlink>
+        <a:srgbClr val="954F72"/>
+      </a:folHlink>
+    </a:clrScheme>
+    <a:fontScheme name="Office">
+      <a:majorFont>
+        <a:latin typeface="Calibri Light" panose="020F0302020204030204"/>
+        <a:ea typeface=""/>
+        <a:cs typeface=""/>
+        <a:font script="Jpan" typeface="游ゴシック Light"/>
+        <a:font script="Hang" typeface="맑은 고딕"/>
+        <a:font script="Hans" typeface="等线 Light"/>
+        <a:font script="Hant" typeface="新細明體"/>
+        <a:font script="Arab" typeface="Times New Roman"/>
+        <a:font script="Hebr" typeface="Times New Roman"/>
+        <a:font script="Thai" typeface="Angsana New"/>
+        <a:font script="Ethi" typeface="Nyala"/>
+        <a:font script="Beng" typeface="Vrinda"/>
+        <a:font script="Gujr" typeface="Shruti"/>
+        <a:font script="Khmr" typeface="MoolBoran"/>
+        <a:font script="Knda" typeface="Tunga"/>
+        <a:font script="Guru" typeface="Raavi"/>
+        <a:font script="Cans" typeface="Euphemia"/>
+        <a:font script="Cher" typeface="Plantagenet Cherokee"/>
+        <a:font script="Yiii" typeface="Microsoft Yi Baiti"/>
+        <a:font script="Tibt" typeface="Microsoft Himalaya"/>
+        <a:font script="Thaa" typeface="MV Boli"/>
+        <a:font script="Deva" typeface="Mangal"/>
+        <a:font script="Telu" typeface="Gautami"/>
+        <a:font script="Taml" typeface="Latha"/>
+        <a:font script="Syrc" typeface="Estrangelo Edessa"/>
+        <a:font script="Orya" typeface="Kalinga"/>
+        <a:font script="Mlym" typeface="Kartika"/>
+        <a:font script="Laoo" typeface="DokChampa"/>
+        <a:font script="Sinh" typeface="Iskoola Pota"/>
+        <a:font script="Mong" typeface="Mongolian Baiti"/>
+        <a:font script="Viet" typeface="Times New Roman"/>
+        <a:font script="Uigh" typeface="Microsoft Uighur"/>
+        <a:font script="Geor" typeface="Sylfaen"/>
+        <a:font script="Armn" typeface="Arial"/>
+        <a:font script="Bugi" typeface="Leelawadee UI"/>
+        <a:font script="Bopo" typeface="Microsoft JhengHei"/>
+        <a:font script="Java" typeface="Javanese Text"/>
+        <a:font script="Lisu" typeface="Segoe UI"/>
+        <a:font script="Mymr" typeface="Myanmar Text"/>
+        <a:font script="Nkoo" typeface="Ebrima"/>
+        <a:font script="Olck" typeface="Nirmala UI"/>
+        <a:font script="Osma" typeface="Ebrima"/>
+        <a:font script="Phag" typeface="Phagspa"/>
+        <a:font script="Syrn" typeface="Estrangelo Edessa"/>
+        <a:font script="Syrj" typeface="Estrangelo Edessa"/>
+        <a:font script="Syre" typeface="Estrangelo Edessa"/>
+        <a:font script="Sora" typeface="Nirmala UI"/>
+        <a:font script="Tale" typeface="Microsoft Tai Le"/>
+        <a:font script="Talu" typeface="Microsoft New Tai Lue"/>
+        <a:font script="Tfng" typeface="Ebrima"/>
+      </a:majorFont>
+      <a:minorFont>
+        <a:latin typeface="Calibri" panose="020F0502020204030204"/>
+        <a:ea typeface=""/>
+        <a:cs typeface=""/>
+        <a:font script="Jpan" typeface="游ゴシック"/>
+        <a:font script="Hang" typeface="맑은 고딕"/>
+        <a:font script="Hans" typeface="等线"/>
+        <a:font script="Hant" typeface="新細明體"/>
+        <a:font script="Arab" typeface="Arial"/>
+        <a:font script="Hebr" typeface="Arial"/>
+        <a:font script="Thai" typeface="Cordia New"/>
+        <a:font script="Ethi" typeface="Nyala"/>
+        <a:font script="Beng" typeface="Vrinda"/>
+        <a:font script="Gujr" typeface="Shruti"/>
+        <a:font script="Khmr" typeface="DaunPenh"/>
+        <a:font script="Knda" typeface="Tunga"/>
+        <a:font script="Guru" typeface="Raavi"/>
+        <a:font script="Cans" typeface="Euphemia"/>
+        <a:font script="Cher" typeface="Plantagenet Cherokee"/>
+        <a:font script="Yiii" typeface="Microsoft Yi Baiti"/>
+        <a:font script="Tibt" typeface="Microsoft Himalaya"/>
+        <a:font script="Thaa" typeface="MV Boli"/>
+        <a:font script="Deva" typeface="Mangal"/>
+        <a:font script="Telu" typeface="Gautami"/>
+        <a:font script="Taml" typeface="Latha"/>
+        <a:font script="Syrc" typeface="Estrangelo Edessa"/>
+        <a:font script="Orya" typeface="Kalinga"/>
+        <a:font script="Mlym" typeface="Kartika"/>
+        <a:font script="Laoo" typeface="DokChampa"/>
+        <a:font script="Sinh" typeface="Iskoola Pota"/>
+        <a:font script="Mong" typeface="Mongolian Baiti"/>
+        <a:font script="Viet" typeface="Arial"/>
+        <a:font script="Uigh" typeface="Microsoft Uighur"/>
+        <a:font script="Geor" typeface="Sylfaen"/>
+        <a:font script="Armn" typeface="Arial"/>
+        <a:font script="Bugi" typeface="Leelawadee UI"/>
+        <a:font script="Bopo" typeface="Microsoft JhengHei"/>
+        <a:font script="Java" typeface="Javanese Text"/>
+        <a:font script="Lisu" typeface="Segoe UI"/>
+        <a:font script="Mymr" typeface="Myanmar Text"/>
+        <a:font script="Nkoo" typeface="Ebrima"/>
+        <a:font script="Olck" typeface="Nirmala UI"/>
+        <a:font script="Osma" typeface="Ebrima"/>
+        <a:font script="Phag" typeface="Phagspa"/>
+        <a:font script="Syrn" typeface="Estrangelo Edessa"/>
+        <a:font script="Syrj" typeface="Estrangelo Edessa"/>
+        <a:font script="Syre" typeface="Estrangelo Edessa"/>
+        <a:font script="Sora" typeface="Nirmala UI"/>
+        <a:font script="Tale" typeface="Microsoft Tai Le"/>
+        <a:font script="Talu" typeface="Microsoft New Tai Lue"/>
+        <a:font script="Tfng" typeface="Ebrima"/>
+      </a:minorFont>
+    </a:fontScheme>
+    <a:fmtScheme name="Office">
+      <a:fillStyleLst>
+        <a:solidFill>
+          <a:schemeClr val="phClr"/>
+        </a:solidFill>
+        <a:gradFill rotWithShape="1">
+          <a:gsLst>
+            <a:gs pos="0">
+              <a:schemeClr val="phClr">
+                <a:lumMod val="110000"/>
+                <a:satMod val="105000"/>
+                <a:tint val="67000"/>
+              </a:schemeClr>
+            </a:gs>
+            <a:gs pos="50000">
+              <a:schemeClr val="phClr">
+                <a:lumMod val="105000"/>
+                <a:satMod val="103000"/>
+                <a:tint val="73000"/>
+              </a:schemeClr>
+            </a:gs>
+            <a:gs pos="100000">
+              <a:schemeClr val="phClr">
+                <a:lumMod val="105000"/>
+                <a:satMod val="109000"/>
+                <a:tint val="81000"/>
+              </a:schemeClr>
+            </a:gs>
+          </a:gsLst>
+          <a:lin ang="5400000" scaled="0"/>
+        </a:gradFill>
+        <a:gradFill rotWithShape="1">
+          <a:gsLst>
+            <a:gs pos="0">
+              <a:schemeClr val="phClr">
+                <a:satMod val="103000"/>
+                <a:lumMod val="102000"/>
+                <a:tint val="94000"/>
+              </a:schemeClr>
+            </a:gs>
+            <a:gs pos="50000">
+              <a:schemeClr val="phClr">
+                <a:satMod val="110000"/>
+                <a:lumMod val="100000"/>
+                <a:shade val="100000"/>
+              </a:schemeClr>
+            </a:gs>
+            <a:gs pos="100000">
+              <a:schemeClr val="phClr">
+                <a:lumMod val="99000"/>
+                <a:satMod val="120000"/>
+                <a:shade val="78000"/>
+              </a:schemeClr>
+            </a:gs>
+          </a:gsLst>
+          <a:lin ang="5400000" scaled="0"/>
+        </a:gradFill>
+      </a:fillStyleLst>
+      <a:lnStyleLst>
+        <a:ln w="6350" cap="flat" cmpd="sng" algn="ctr">
+          <a:solidFill>
+            <a:schemeClr val="phClr"/>
+          </a:solidFill>
+          <a:prstDash val="solid"/>
+          <a:miter lim="800000"/>
+        </a:ln>
+        <a:ln w="12700" cap="flat" cmpd="sng" algn="ctr">
+          <a:solidFill>
+            <a:schemeClr val="phClr"/>
+          </a:solidFill>
+          <a:prstDash val="solid"/>
+          <a:miter lim="800000"/>
+        </a:ln>
+        <a:ln w="19050" cap="flat" cmpd="sng" algn="ctr">
+          <a:solidFill>
+            <a:schemeClr val="phClr"/>
+          </a:solidFill>
+          <a:prstDash val="solid"/>
+          <a:miter lim="800000"/>
+        </a:ln>
+      </a:lnStyleLst>
+      <a:effectStyleLst>
+        <a:effectStyle>
+          <a:effectLst/>
+        </a:effectStyle>
+        <a:effectStyle>
+          <a:effectLst/>
+        </a:effectStyle>
+        <a:effectStyle>
+          <a:effectLst>
+            <a:outerShdw blurRad="57150" dist="19050" dir="5400000" algn="ctr" rotWithShape="0">
+              <a:srgbClr val="000000">
+                <a:alpha val="63000"/>
+              </a:srgbClr>
+            </a:outerShdw>
+          </a:effectLst>
+        </a:effectStyle>
+      </a:effectStyleLst>
+      <a:bgFillStyleLst>
+        <a:solidFill>
+          <a:schemeClr val="phClr"/>
+        </a:solidFill>
+        <a:solidFill>
+          <a:schemeClr val="phClr">
+            <a:tint val="95000"/>
+            <a:satMod val="170000"/>
+          </a:schemeClr>
+        </a:solidFill>
+        <a:gradFill rotWithShape="1">
+          <a:gsLst>
+            <a:gs pos="0">
+              <a:schemeClr val="phClr">
+                <a:tint val="93000"/>
+                <a:satMod val="150000"/>
+                <a:shade val="98000"/>
+                <a:lumMod val="102000"/>
+              </a:schemeClr>
+            </a:gs>
+            <a:gs pos="50000">
+              <a:schemeClr val="phClr">
+                <a:tint val="98000"/>
+                <a:satMod val="130000"/>
+                <a:shade val="90000"/>
+                <a:lumMod val="103000"/>
+              </a:schemeClr>
+            </a:gs>
+            <a:gs pos="100000">
+              <a:schemeClr val="phClr">
+                <a:shade val="63000"/>
+                <a:satMod val="120000"/>
+              </a:schemeClr>
+            </a:gs>
+          </a:gsLst>
+          <a:lin ang="5400000" scaled="0"/>
+        </a:gradFill>
+      </a:bgFillStyleLst>
+    </a:fmtScheme>
+  </a:themeElements>
+  <a:objectDefaults/>
+  <a:extraClrSchemeLst/>
+  <a:extLst>
+    <a:ext uri="{05A4C25C-085E-4340-85A3-A5531E510DB2}">
+      <thm15:themeFamily xmlns:thm15="http://schemas.microsoft.com/office/thememl/2012/main" name="Office Theme" id="{62F939B6-93AF-4DB8-9C6B-D6C7DFDC589F}" vid="{4A3C46E8-61CC-4603-A589-7422A47A8E4A}"/>
+    </a:ext>
+  </a:extLst>
+</a:theme>
 </file>
</xml_diff>